<commit_message>
Avancees ppt ; Intervales de confiance toujours pas bon pour le dernier modèle SARIMA
</commit_message>
<xml_diff>
--- a/Présentation Projet_8.pptx
+++ b/Présentation Projet_8.pptx
@@ -5,7 +5,7 @@
     <p:sldMasterId id="2147483648" r:id="rId1"/>
   </p:sldMasterIdLst>
   <p:notesMasterIdLst>
-    <p:notesMasterId r:id="rId28"/>
+    <p:notesMasterId r:id="rId29"/>
   </p:notesMasterIdLst>
   <p:sldIdLst>
     <p:sldId id="257" r:id="rId2"/>
@@ -32,8 +32,9 @@
     <p:sldId id="351" r:id="rId23"/>
     <p:sldId id="356" r:id="rId24"/>
     <p:sldId id="358" r:id="rId25"/>
-    <p:sldId id="357" r:id="rId26"/>
+    <p:sldId id="359" r:id="rId26"/>
     <p:sldId id="344" r:id="rId27"/>
+    <p:sldId id="357" r:id="rId28"/>
   </p:sldIdLst>
   <p:sldSz cx="12192000" cy="6858000"/>
   <p:notesSz cx="6858000" cy="9144000"/>
@@ -222,7 +223,7 @@
           <a:p>
             <a:fld id="{24BDB1B6-1944-4F8E-B0F9-2E045F0EA551}" type="datetimeFigureOut">
               <a:rPr lang="fr-FR" smtClean="0"/>
-              <a:t>08/08/2019</a:t>
+              <a:t>12/08/2019</a:t>
             </a:fld>
             <a:endParaRPr lang="fr-FR"/>
           </a:p>
@@ -1319,6 +1320,93 @@
     </p:spTree>
     <p:extLst>
       <p:ext uri="{BB962C8B-B14F-4D97-AF65-F5344CB8AC3E}">
+        <p14:creationId xmlns:p14="http://schemas.microsoft.com/office/powerpoint/2010/main" val="4070164464"/>
+      </p:ext>
+    </p:extLst>
+  </p:cSld>
+  <p:clrMapOvr>
+    <a:masterClrMapping/>
+  </p:clrMapOvr>
+</p:notes>
+</file>
+
+<file path=ppt/notesSlides/notesSlide19.xml><?xml version="1.0" encoding="utf-8"?>
+<p:notes xmlns:a="http://schemas.openxmlformats.org/drawingml/2006/main" xmlns:r="http://schemas.openxmlformats.org/officeDocument/2006/relationships" xmlns:p="http://schemas.openxmlformats.org/presentationml/2006/main">
+  <p:cSld>
+    <p:spTree>
+      <p:nvGrpSpPr>
+        <p:cNvPr id="1" name=""/>
+        <p:cNvGrpSpPr/>
+        <p:nvPr/>
+      </p:nvGrpSpPr>
+      <p:grpSpPr>
+        <a:xfrm>
+          <a:off x="0" y="0"/>
+          <a:ext cx="0" cy="0"/>
+          <a:chOff x="0" y="0"/>
+          <a:chExt cx="0" cy="0"/>
+        </a:xfrm>
+      </p:grpSpPr>
+      <p:sp>
+        <p:nvSpPr>
+          <p:cNvPr id="2" name="Espace réservé de l'image des diapositives 1"/>
+          <p:cNvSpPr>
+            <a:spLocks noGrp="1" noRot="1" noChangeAspect="1"/>
+          </p:cNvSpPr>
+          <p:nvPr>
+            <p:ph type="sldImg"/>
+          </p:nvPr>
+        </p:nvSpPr>
+        <p:spPr/>
+      </p:sp>
+      <p:sp>
+        <p:nvSpPr>
+          <p:cNvPr id="3" name="Espace réservé des notes 2"/>
+          <p:cNvSpPr>
+            <a:spLocks noGrp="1"/>
+          </p:cNvSpPr>
+          <p:nvPr>
+            <p:ph type="body" idx="1"/>
+          </p:nvPr>
+        </p:nvSpPr>
+        <p:spPr/>
+        <p:txBody>
+          <a:bodyPr/>
+          <a:lstStyle/>
+          <a:p>
+            <a:r>
+              <a:rPr lang="fr-FR" dirty="0"/>
+              <a:t>https://www.infoclimat.fr/climatologie/annee/2018/clermont-ferrand-aulnat/valeurs/07460.html</a:t>
+            </a:r>
+          </a:p>
+        </p:txBody>
+      </p:sp>
+      <p:sp>
+        <p:nvSpPr>
+          <p:cNvPr id="4" name="Espace réservé du numéro de diapositive 3"/>
+          <p:cNvSpPr>
+            <a:spLocks noGrp="1"/>
+          </p:cNvSpPr>
+          <p:nvPr>
+            <p:ph type="sldNum" sz="quarter" idx="5"/>
+          </p:nvPr>
+        </p:nvSpPr>
+        <p:spPr/>
+        <p:txBody>
+          <a:bodyPr/>
+          <a:lstStyle/>
+          <a:p>
+            <a:fld id="{325B34E7-32E1-48C9-BFA3-CE4FB073F9A9}" type="slidenum">
+              <a:rPr lang="fr-FR" smtClean="0"/>
+              <a:t>27</a:t>
+            </a:fld>
+            <a:endParaRPr lang="fr-FR"/>
+          </a:p>
+        </p:txBody>
+      </p:sp>
+    </p:spTree>
+    <p:extLst>
+      <p:ext uri="{BB962C8B-B14F-4D97-AF65-F5344CB8AC3E}">
         <p14:creationId xmlns:p14="http://schemas.microsoft.com/office/powerpoint/2010/main" val="1235642754"/>
       </p:ext>
     </p:extLst>
@@ -2148,7 +2236,7 @@
           <a:p>
             <a:fld id="{2D857B19-A201-4351-B69C-6F9100DB4F49}" type="datetimeFigureOut">
               <a:rPr lang="fr-FR" smtClean="0"/>
-              <a:t>08/08/2019</a:t>
+              <a:t>12/08/2019</a:t>
             </a:fld>
             <a:endParaRPr lang="fr-FR"/>
           </a:p>
@@ -2346,7 +2434,7 @@
           <a:p>
             <a:fld id="{2D857B19-A201-4351-B69C-6F9100DB4F49}" type="datetimeFigureOut">
               <a:rPr lang="fr-FR" smtClean="0"/>
-              <a:t>08/08/2019</a:t>
+              <a:t>12/08/2019</a:t>
             </a:fld>
             <a:endParaRPr lang="fr-FR"/>
           </a:p>
@@ -2554,7 +2642,7 @@
           <a:p>
             <a:fld id="{2D857B19-A201-4351-B69C-6F9100DB4F49}" type="datetimeFigureOut">
               <a:rPr lang="fr-FR" smtClean="0"/>
-              <a:t>08/08/2019</a:t>
+              <a:t>12/08/2019</a:t>
             </a:fld>
             <a:endParaRPr lang="fr-FR"/>
           </a:p>
@@ -2752,7 +2840,7 @@
           <a:p>
             <a:fld id="{2D857B19-A201-4351-B69C-6F9100DB4F49}" type="datetimeFigureOut">
               <a:rPr lang="fr-FR" smtClean="0"/>
-              <a:t>08/08/2019</a:t>
+              <a:t>12/08/2019</a:t>
             </a:fld>
             <a:endParaRPr lang="fr-FR"/>
           </a:p>
@@ -3027,7 +3115,7 @@
           <a:p>
             <a:fld id="{2D857B19-A201-4351-B69C-6F9100DB4F49}" type="datetimeFigureOut">
               <a:rPr lang="fr-FR" smtClean="0"/>
-              <a:t>08/08/2019</a:t>
+              <a:t>12/08/2019</a:t>
             </a:fld>
             <a:endParaRPr lang="fr-FR"/>
           </a:p>
@@ -3292,7 +3380,7 @@
           <a:p>
             <a:fld id="{2D857B19-A201-4351-B69C-6F9100DB4F49}" type="datetimeFigureOut">
               <a:rPr lang="fr-FR" smtClean="0"/>
-              <a:t>08/08/2019</a:t>
+              <a:t>12/08/2019</a:t>
             </a:fld>
             <a:endParaRPr lang="fr-FR"/>
           </a:p>
@@ -3704,7 +3792,7 @@
           <a:p>
             <a:fld id="{2D857B19-A201-4351-B69C-6F9100DB4F49}" type="datetimeFigureOut">
               <a:rPr lang="fr-FR" smtClean="0"/>
-              <a:t>08/08/2019</a:t>
+              <a:t>12/08/2019</a:t>
             </a:fld>
             <a:endParaRPr lang="fr-FR"/>
           </a:p>
@@ -3845,7 +3933,7 @@
           <a:p>
             <a:fld id="{2D857B19-A201-4351-B69C-6F9100DB4F49}" type="datetimeFigureOut">
               <a:rPr lang="fr-FR" smtClean="0"/>
-              <a:t>08/08/2019</a:t>
+              <a:t>12/08/2019</a:t>
             </a:fld>
             <a:endParaRPr lang="fr-FR"/>
           </a:p>
@@ -3958,7 +4046,7 @@
           <a:p>
             <a:fld id="{2D857B19-A201-4351-B69C-6F9100DB4F49}" type="datetimeFigureOut">
               <a:rPr lang="fr-FR" smtClean="0"/>
-              <a:t>08/08/2019</a:t>
+              <a:t>12/08/2019</a:t>
             </a:fld>
             <a:endParaRPr lang="fr-FR"/>
           </a:p>
@@ -4269,7 +4357,7 @@
           <a:p>
             <a:fld id="{2D857B19-A201-4351-B69C-6F9100DB4F49}" type="datetimeFigureOut">
               <a:rPr lang="fr-FR" smtClean="0"/>
-              <a:t>08/08/2019</a:t>
+              <a:t>12/08/2019</a:t>
             </a:fld>
             <a:endParaRPr lang="fr-FR"/>
           </a:p>
@@ -4557,7 +4645,7 @@
           <a:p>
             <a:fld id="{2D857B19-A201-4351-B69C-6F9100DB4F49}" type="datetimeFigureOut">
               <a:rPr lang="fr-FR" smtClean="0"/>
-              <a:t>08/08/2019</a:t>
+              <a:t>12/08/2019</a:t>
             </a:fld>
             <a:endParaRPr lang="fr-FR"/>
           </a:p>
@@ -4798,7 +4886,7 @@
           <a:p>
             <a:fld id="{2D857B19-A201-4351-B69C-6F9100DB4F49}" type="datetimeFigureOut">
               <a:rPr lang="fr-FR" smtClean="0"/>
-              <a:t>08/08/2019</a:t>
+              <a:t>12/08/2019</a:t>
             </a:fld>
             <a:endParaRPr lang="fr-FR"/>
           </a:p>
@@ -10076,7 +10164,7 @@
     </p:spTree>
     <p:extLst>
       <p:ext uri="{BB962C8B-B14F-4D97-AF65-F5344CB8AC3E}">
-        <p14:creationId xmlns:p14="http://schemas.microsoft.com/office/powerpoint/2010/main" val="2024546779"/>
+        <p14:creationId xmlns:p14="http://schemas.microsoft.com/office/powerpoint/2010/main" val="1428905732"/>
       </p:ext>
     </p:extLst>
   </p:cSld>
@@ -10426,6 +10514,131 @@
   </p:cSld>
   <p:clrMapOvr>
     <a:overrideClrMapping bg1="dk1" tx1="lt1" bg2="dk2" tx2="lt2" accent1="accent1" accent2="accent2" accent3="accent3" accent4="accent4" accent5="accent5" accent6="accent6" hlink="hlink" folHlink="folHlink"/>
+  </p:clrMapOvr>
+</p:sld>
+</file>
+
+<file path=ppt/slides/slide27.xml><?xml version="1.0" encoding="utf-8"?>
+<p:sld xmlns:a="http://schemas.openxmlformats.org/drawingml/2006/main" xmlns:r="http://schemas.openxmlformats.org/officeDocument/2006/relationships" xmlns:p="http://schemas.openxmlformats.org/presentationml/2006/main">
+  <p:cSld>
+    <p:spTree>
+      <p:nvGrpSpPr>
+        <p:cNvPr id="1" name=""/>
+        <p:cNvGrpSpPr/>
+        <p:nvPr/>
+      </p:nvGrpSpPr>
+      <p:grpSpPr>
+        <a:xfrm>
+          <a:off x="0" y="0"/>
+          <a:ext cx="0" cy="0"/>
+          <a:chOff x="0" y="0"/>
+          <a:chExt cx="0" cy="0"/>
+        </a:xfrm>
+      </p:grpSpPr>
+      <p:sp>
+        <p:nvSpPr>
+          <p:cNvPr id="2" name="Titre 1">
+            <a:extLst>
+              <a:ext uri="{FF2B5EF4-FFF2-40B4-BE49-F238E27FC236}">
+                <a16:creationId xmlns:a16="http://schemas.microsoft.com/office/drawing/2014/main" id="{97FA8879-5ADD-4153-9C4A-CF78B1D5CA27}"/>
+              </a:ext>
+            </a:extLst>
+          </p:cNvPr>
+          <p:cNvSpPr>
+            <a:spLocks noGrp="1"/>
+          </p:cNvSpPr>
+          <p:nvPr>
+            <p:ph type="title"/>
+          </p:nvPr>
+        </p:nvSpPr>
+        <p:spPr/>
+        <p:txBody>
+          <a:bodyPr/>
+          <a:lstStyle/>
+          <a:p>
+            <a:pPr algn="ctr"/>
+            <a:r>
+              <a:rPr lang="fr-FR" dirty="0"/>
+              <a:t>Annexes</a:t>
+            </a:r>
+          </a:p>
+        </p:txBody>
+      </p:sp>
+      <p:pic>
+        <p:nvPicPr>
+          <p:cNvPr id="3" name="Image 2">
+            <a:extLst>
+              <a:ext uri="{FF2B5EF4-FFF2-40B4-BE49-F238E27FC236}">
+                <a16:creationId xmlns:a16="http://schemas.microsoft.com/office/drawing/2014/main" id="{0FF4B3BB-055B-47BF-B548-DF65C111BFFB}"/>
+              </a:ext>
+            </a:extLst>
+          </p:cNvPr>
+          <p:cNvPicPr>
+            <a:picLocks noChangeAspect="1"/>
+          </p:cNvPicPr>
+          <p:nvPr/>
+        </p:nvPicPr>
+        <p:blipFill>
+          <a:blip r:embed="rId3">
+            <a:extLst>
+              <a:ext uri="{28A0092B-C50C-407E-A947-70E740481C1C}">
+                <a14:useLocalDpi xmlns:a14="http://schemas.microsoft.com/office/drawing/2010/main" val="0"/>
+              </a:ext>
+            </a:extLst>
+          </a:blip>
+          <a:stretch>
+            <a:fillRect/>
+          </a:stretch>
+        </p:blipFill>
+        <p:spPr>
+          <a:xfrm>
+            <a:off x="10769600" y="5435600"/>
+            <a:ext cx="1422400" cy="1422400"/>
+          </a:xfrm>
+          <a:prstGeom prst="rect">
+            <a:avLst/>
+          </a:prstGeom>
+        </p:spPr>
+      </p:pic>
+      <p:pic>
+        <p:nvPicPr>
+          <p:cNvPr id="4" name="Image 3">
+            <a:extLst>
+              <a:ext uri="{FF2B5EF4-FFF2-40B4-BE49-F238E27FC236}">
+                <a16:creationId xmlns:a16="http://schemas.microsoft.com/office/drawing/2014/main" id="{D6A7E1DE-8146-4F8F-A265-BF9B585287E6}"/>
+              </a:ext>
+            </a:extLst>
+          </p:cNvPr>
+          <p:cNvPicPr>
+            <a:picLocks noChangeAspect="1"/>
+          </p:cNvPicPr>
+          <p:nvPr/>
+        </p:nvPicPr>
+        <p:blipFill>
+          <a:blip r:embed="rId4"/>
+          <a:stretch>
+            <a:fillRect/>
+          </a:stretch>
+        </p:blipFill>
+        <p:spPr>
+          <a:xfrm>
+            <a:off x="4805362" y="1624012"/>
+            <a:ext cx="2581275" cy="3609975"/>
+          </a:xfrm>
+          <a:prstGeom prst="rect">
+            <a:avLst/>
+          </a:prstGeom>
+        </p:spPr>
+      </p:pic>
+    </p:spTree>
+    <p:extLst>
+      <p:ext uri="{BB962C8B-B14F-4D97-AF65-F5344CB8AC3E}">
+        <p14:creationId xmlns:p14="http://schemas.microsoft.com/office/powerpoint/2010/main" val="2024546779"/>
+      </p:ext>
+    </p:extLst>
+  </p:cSld>
+  <p:clrMapOvr>
+    <a:masterClrMapping/>
   </p:clrMapOvr>
 </p:sld>
 </file>

</xml_diff>